<commit_message>
modified the pptx issue
</commit_message>
<xml_diff>
--- a/Term Project - Group 6 .pptx
+++ b/Term Project - Group 6 .pptx
@@ -125,6 +125,14 @@
     </p:ext>
   </p:extLst>
 </p:presentation>
+</file>
+
+<file path=ppt/revisionInfo.xml><?xml version="1.0" encoding="utf-8"?>
+<p1510:revInfo xmlns:a="http://schemas.openxmlformats.org/drawingml/2006/main" xmlns:r="http://schemas.openxmlformats.org/officeDocument/2006/relationships" xmlns:p1510="http://schemas.microsoft.com/office/powerpoint/2015/10/main">
+  <p1510:revLst>
+    <p1510:client id="{170A6833-8E57-BAF4-F135-2EBCA40ED4F7}" v="257" dt="2024-05-28T20:40:05.346"/>
+  </p1510:revLst>
+</p1510:revInfo>
 </file>
 
 <file path=ppt/diagrams/colors1.xml><?xml version="1.0" encoding="utf-8"?>
@@ -26741,20 +26749,22 @@
           <a:noFill/>
         </p:spPr>
         <p:txBody>
-          <a:bodyPr wrap="square" rtlCol="0">
+          <a:bodyPr wrap="square" lIns="91440" tIns="45720" rIns="91440" bIns="45720" rtlCol="0" anchor="t">
             <a:spAutoFit/>
           </a:bodyPr>
           <a:lstStyle/>
           <a:p>
             <a:r>
-              <a:rPr lang="en-GB" dirty="0"/>
-              <a:t>Introduction                II. Data cleaning                   IV. First models application        VI. Features selection</a:t>
+              <a:rPr lang="en-GB" dirty="0">
+                <a:solidFill>
+                  <a:srgbClr val="000000"/>
+                </a:solidFill>
+              </a:rPr>
+              <a:t>Introduction</a:t>
             </a:r>
-          </a:p>
-          <a:p>
             <a:r>
               <a:rPr lang="en-GB" dirty="0"/>
-              <a:t>I. Data description     III. Data preprocessing        </a:t>
+              <a:t>                II. Data cleaning                       </a:t>
             </a:r>
             <a:r>
               <a:rPr lang="en-GB" b="1" dirty="0">
@@ -26762,7 +26772,28 @@
                   <a:srgbClr val="FF0000"/>
                 </a:solidFill>
               </a:rPr>
-              <a:t>V. Grid search application          </a:t>
+              <a:t>IV. Grid search application</a:t>
+            </a:r>
+            <a:r>
+              <a:rPr lang="en-GB" dirty="0"/>
+              <a:t>      </a:t>
+            </a:r>
+            <a:endParaRPr lang="en-US">
+              <a:cs typeface="Calibri"/>
+            </a:endParaRPr>
+          </a:p>
+          <a:p>
+            <a:r>
+              <a:rPr lang="en-GB" dirty="0"/>
+              <a:t>I. Data description      III. First models application      </a:t>
+            </a:r>
+            <a:r>
+              <a:rPr lang="en-GB" dirty="0">
+                <a:solidFill>
+                  <a:srgbClr val="000000"/>
+                </a:solidFill>
+              </a:rPr>
+              <a:t>  V. Features selection            </a:t>
             </a:r>
             <a:r>
               <a:rPr lang="en-GB" dirty="0"/>
@@ -27319,7 +27350,7 @@
         <p:spPr>
           <a:xfrm>
             <a:off x="754144" y="169682"/>
-            <a:ext cx="11594969" cy="646331"/>
+            <a:ext cx="11594969" cy="923330"/>
           </a:xfrm>
           <a:prstGeom prst="rect">
             <a:avLst/>
@@ -27327,14 +27358,42 @@
           <a:noFill/>
         </p:spPr>
         <p:txBody>
-          <a:bodyPr wrap="square" rtlCol="0">
+          <a:bodyPr wrap="square" lIns="91440" tIns="45720" rIns="91440" bIns="45720" rtlCol="0" anchor="t">
             <a:spAutoFit/>
           </a:bodyPr>
           <a:lstStyle/>
           <a:p>
             <a:r>
+              <a:rPr lang="en-GB" dirty="0">
+                <a:solidFill>
+                  <a:srgbClr val="000000"/>
+                </a:solidFill>
+              </a:rPr>
+              <a:t>Introduction</a:t>
+            </a:r>
+            <a:r>
               <a:rPr lang="en-GB" dirty="0"/>
-              <a:t>Introduction                II. Data cleaning                   IV. First models application        </a:t>
+              <a:t>                II. Data cleaning                       IV. Grid search application</a:t>
+            </a:r>
+            <a:r>
+              <a:rPr lang="en-GB" dirty="0">
+                <a:solidFill>
+                  <a:srgbClr val="000000"/>
+                </a:solidFill>
+              </a:rPr>
+              <a:t>      </a:t>
+            </a:r>
+            <a:endParaRPr lang="en-US">
+              <a:solidFill>
+                <a:srgbClr val="000000"/>
+              </a:solidFill>
+              <a:cs typeface="Calibri"/>
+            </a:endParaRPr>
+          </a:p>
+          <a:p>
+            <a:r>
+              <a:rPr lang="en-GB" dirty="0"/>
+              <a:t>I. Data description      III. First models application        </a:t>
             </a:r>
             <a:r>
               <a:rPr lang="en-GB" b="1" dirty="0">
@@ -27342,14 +27401,20 @@
                   <a:srgbClr val="FF0000"/>
                 </a:solidFill>
               </a:rPr>
-              <a:t>VI. Features selection</a:t>
+              <a:t>V. Features selection </a:t>
+            </a:r>
+            <a:r>
+              <a:rPr lang="en-GB" dirty="0"/>
+              <a:t>           Conclusion</a:t>
             </a:r>
           </a:p>
           <a:p>
-            <a:r>
-              <a:rPr lang="en-GB" dirty="0"/>
-              <a:t>I. Data description     III. Data preprocessing        V. Grid search application          Conclusion</a:t>
-            </a:r>
+            <a:endParaRPr lang="en-GB" b="1" dirty="0">
+              <a:solidFill>
+                <a:srgbClr val="FF0000"/>
+              </a:solidFill>
+              <a:cs typeface="Calibri"/>
+            </a:endParaRPr>
           </a:p>
         </p:txBody>
       </p:sp>
@@ -27687,7 +27752,7 @@
         <p:spPr>
           <a:xfrm>
             <a:off x="754144" y="169682"/>
-            <a:ext cx="11594969" cy="646331"/>
+            <a:ext cx="11594969" cy="923330"/>
           </a:xfrm>
           <a:prstGeom prst="rect">
             <a:avLst/>
@@ -27695,14 +27760,42 @@
           <a:noFill/>
         </p:spPr>
         <p:txBody>
-          <a:bodyPr wrap="square" rtlCol="0">
+          <a:bodyPr wrap="square" lIns="91440" tIns="45720" rIns="91440" bIns="45720" rtlCol="0" anchor="t">
             <a:spAutoFit/>
           </a:bodyPr>
           <a:lstStyle/>
           <a:p>
             <a:r>
+              <a:rPr lang="en-GB" dirty="0">
+                <a:solidFill>
+                  <a:srgbClr val="000000"/>
+                </a:solidFill>
+              </a:rPr>
+              <a:t>Introduction</a:t>
+            </a:r>
+            <a:r>
               <a:rPr lang="en-GB" dirty="0"/>
-              <a:t>Introduction                II. Data cleaning                   IV. First models application        </a:t>
+              <a:t>                II. Data cleaning                       IV. Grid search application</a:t>
+            </a:r>
+            <a:r>
+              <a:rPr lang="en-GB" dirty="0">
+                <a:solidFill>
+                  <a:srgbClr val="000000"/>
+                </a:solidFill>
+              </a:rPr>
+              <a:t>      </a:t>
+            </a:r>
+            <a:endParaRPr lang="en-US">
+              <a:solidFill>
+                <a:srgbClr val="000000"/>
+              </a:solidFill>
+              <a:cs typeface="Calibri"/>
+            </a:endParaRPr>
+          </a:p>
+          <a:p>
+            <a:r>
+              <a:rPr lang="en-GB" dirty="0"/>
+              <a:t>I. Data description      III. First models application        </a:t>
             </a:r>
             <a:r>
               <a:rPr lang="en-GB" b="1" dirty="0">
@@ -27710,14 +27803,20 @@
                   <a:srgbClr val="FF0000"/>
                 </a:solidFill>
               </a:rPr>
-              <a:t>VI. Features selection</a:t>
+              <a:t>V. Features selection</a:t>
+            </a:r>
+            <a:r>
+              <a:rPr lang="en-GB" dirty="0"/>
+              <a:t>            Conclusion</a:t>
             </a:r>
           </a:p>
           <a:p>
-            <a:r>
-              <a:rPr lang="en-GB" dirty="0"/>
-              <a:t>I. Data description     III. Data preprocessing        V. Grid search application          Conclusion</a:t>
-            </a:r>
+            <a:endParaRPr lang="en-GB" b="1" dirty="0">
+              <a:solidFill>
+                <a:srgbClr val="FF0000"/>
+              </a:solidFill>
+              <a:cs typeface="Calibri"/>
+            </a:endParaRPr>
           </a:p>
         </p:txBody>
       </p:sp>
@@ -28720,7 +28819,7 @@
         <p:spPr>
           <a:xfrm>
             <a:off x="754144" y="169682"/>
-            <a:ext cx="11594969" cy="646331"/>
+            <a:ext cx="11594969" cy="923330"/>
           </a:xfrm>
           <a:prstGeom prst="rect">
             <a:avLst/>
@@ -28728,29 +28827,54 @@
           <a:noFill/>
         </p:spPr>
         <p:txBody>
-          <a:bodyPr wrap="square" rtlCol="0">
+          <a:bodyPr wrap="square" lIns="91440" tIns="45720" rIns="91440" bIns="45720" rtlCol="0" anchor="t">
             <a:spAutoFit/>
           </a:bodyPr>
           <a:lstStyle/>
           <a:p>
             <a:r>
+              <a:rPr lang="en-GB" dirty="0">
+                <a:solidFill>
+                  <a:srgbClr val="000000"/>
+                </a:solidFill>
+              </a:rPr>
+              <a:t>Introduction</a:t>
+            </a:r>
+            <a:r>
               <a:rPr lang="en-GB" dirty="0"/>
-              <a:t>Introduction                II. Data cleaning                   IV. First models application        VI. Features selection</a:t>
+              <a:t>                II. Data cleaning                       IV. Grid search application      </a:t>
             </a:r>
+            <a:endParaRPr lang="en-US" dirty="0">
+              <a:cs typeface="Calibri"/>
+            </a:endParaRPr>
           </a:p>
           <a:p>
             <a:r>
               <a:rPr lang="en-GB" dirty="0"/>
-              <a:t>I. Data description     III. Data preprocessing        V. Grid search application          </a:t>
+              <a:t>I. Data description      III. First models application        V. Features selection            </a:t>
             </a:r>
             <a:r>
-              <a:rPr lang="en-GB" dirty="0">
+              <a:rPr lang="en-GB" b="1" dirty="0">
                 <a:solidFill>
                   <a:srgbClr val="FF0000"/>
                 </a:solidFill>
               </a:rPr>
               <a:t>Conclusion</a:t>
             </a:r>
+            <a:endParaRPr lang="en-GB" b="1" dirty="0">
+              <a:solidFill>
+                <a:srgbClr val="FF0000"/>
+              </a:solidFill>
+              <a:cs typeface="Calibri"/>
+            </a:endParaRPr>
+          </a:p>
+          <a:p>
+            <a:endParaRPr lang="en-GB" dirty="0">
+              <a:solidFill>
+                <a:srgbClr val="000000"/>
+              </a:solidFill>
+              <a:cs typeface="Calibri"/>
+            </a:endParaRPr>
           </a:p>
         </p:txBody>
       </p:sp>
@@ -29226,7 +29350,7 @@
           <a:noFill/>
         </p:spPr>
         <p:txBody>
-          <a:bodyPr wrap="square" rtlCol="0">
+          <a:bodyPr wrap="square" lIns="91440" tIns="45720" rIns="91440" bIns="45720" rtlCol="0" anchor="t">
             <a:spAutoFit/>
           </a:bodyPr>
           <a:lstStyle/>
@@ -29241,14 +29365,17 @@
             </a:r>
             <a:r>
               <a:rPr lang="en-GB" dirty="0"/>
-              <a:t>                II. Data cleaning                   IV. First models application        VI. Features selection</a:t>
+              <a:t>                II. Data cleaning                       IV. Grid search application      </a:t>
             </a:r>
           </a:p>
           <a:p>
             <a:r>
               <a:rPr lang="en-GB" dirty="0"/>
-              <a:t>I. Data description      III. Data preprocessing        V. Grid search application          Conclusion</a:t>
+              <a:t>I. Data description      III. First models application        V. Features selection            Conclusion</a:t>
             </a:r>
+            <a:endParaRPr lang="en-GB" dirty="0">
+              <a:cs typeface="Calibri"/>
+            </a:endParaRPr>
           </a:p>
         </p:txBody>
       </p:sp>
@@ -30015,7 +30142,7 @@
         <p:spPr>
           <a:xfrm>
             <a:off x="754144" y="169682"/>
-            <a:ext cx="11594969" cy="646331"/>
+            <a:ext cx="11594969" cy="923330"/>
           </a:xfrm>
           <a:prstGeom prst="rect">
             <a:avLst/>
@@ -30023,15 +30150,18 @@
           <a:noFill/>
         </p:spPr>
         <p:txBody>
-          <a:bodyPr wrap="square" rtlCol="0">
+          <a:bodyPr wrap="square" lIns="91440" tIns="45720" rIns="91440" bIns="45720" rtlCol="0" anchor="t">
             <a:spAutoFit/>
           </a:bodyPr>
           <a:lstStyle/>
           <a:p>
             <a:r>
               <a:rPr lang="en-GB" dirty="0"/>
-              <a:t>Introduction                II. Data cleaning                   IV. First models application        VI. Features selection</a:t>
+              <a:t>Introduction                II. Data cleaning                       IV. Grid search application      </a:t>
             </a:r>
+            <a:endParaRPr lang="en-US">
+              <a:cs typeface="Calibri"/>
+            </a:endParaRPr>
           </a:p>
           <a:p>
             <a:r>
@@ -30040,12 +30170,28 @@
                   <a:srgbClr val="FF0000"/>
                 </a:solidFill>
               </a:rPr>
-              <a:t>I. Data description     </a:t>
+              <a:t>I. Data description   </a:t>
+            </a:r>
+            <a:r>
+              <a:rPr lang="en-GB" dirty="0">
+                <a:solidFill>
+                  <a:srgbClr val="000000"/>
+                </a:solidFill>
+              </a:rPr>
+              <a:t>   </a:t>
             </a:r>
             <a:r>
               <a:rPr lang="en-GB" dirty="0"/>
-              <a:t>III. Data preprocessing        V. Grid search application          Conclusion</a:t>
+              <a:t>III. First models application        V. Features selection            Conclusion</a:t>
             </a:r>
+            <a:endParaRPr lang="en-GB">
+              <a:cs typeface="Calibri"/>
+            </a:endParaRPr>
+          </a:p>
+          <a:p>
+            <a:endParaRPr lang="en-GB" dirty="0">
+              <a:cs typeface="Calibri"/>
+            </a:endParaRPr>
           </a:p>
         </p:txBody>
       </p:sp>
@@ -30459,7 +30605,7 @@
         <p:spPr>
           <a:xfrm>
             <a:off x="754144" y="169682"/>
-            <a:ext cx="11594969" cy="646331"/>
+            <a:ext cx="11594969" cy="923330"/>
           </a:xfrm>
           <a:prstGeom prst="rect">
             <a:avLst/>
@@ -30467,15 +30613,26 @@
           <a:noFill/>
         </p:spPr>
         <p:txBody>
-          <a:bodyPr wrap="square" rtlCol="0">
+          <a:bodyPr wrap="square" lIns="91440" tIns="45720" rIns="91440" bIns="45720" rtlCol="0" anchor="t">
             <a:spAutoFit/>
           </a:bodyPr>
           <a:lstStyle/>
           <a:p>
             <a:r>
+              <a:rPr lang="en-GB" dirty="0">
+                <a:solidFill>
+                  <a:srgbClr val="000000"/>
+                </a:solidFill>
+              </a:rPr>
+              <a:t>Introduction</a:t>
+            </a:r>
+            <a:r>
               <a:rPr lang="en-GB" dirty="0"/>
-              <a:t>Introduction                II. Data cleaning                   IV. First models application        VI. Features selection</a:t>
+              <a:t>                II. Data cleaning                       IV. Grid search application      </a:t>
             </a:r>
+            <a:endParaRPr lang="en-US" dirty="0">
+              <a:cs typeface="Calibri"/>
+            </a:endParaRPr>
           </a:p>
           <a:p>
             <a:r>
@@ -30484,12 +30641,25 @@
                   <a:srgbClr val="FF0000"/>
                 </a:solidFill>
               </a:rPr>
-              <a:t>I. Data description     </a:t>
+              <a:t>I. Data description</a:t>
+            </a:r>
+            <a:r>
+              <a:rPr lang="en-GB" dirty="0">
+                <a:solidFill>
+                  <a:srgbClr val="000000"/>
+                </a:solidFill>
+              </a:rPr>
+              <a:t>      </a:t>
             </a:r>
             <a:r>
               <a:rPr lang="en-GB" dirty="0"/>
-              <a:t>III. Data preprocessing        V. Grid search application          Conclusion</a:t>
+              <a:t>III. First models application        V. Features selection            Conclusion</a:t>
             </a:r>
+          </a:p>
+          <a:p>
+            <a:endParaRPr lang="en-GB" dirty="0">
+              <a:cs typeface="Calibri"/>
+            </a:endParaRPr>
           </a:p>
         </p:txBody>
       </p:sp>
@@ -30669,7 +30839,7 @@
         <p:spPr>
           <a:xfrm>
             <a:off x="754144" y="169682"/>
-            <a:ext cx="11594969" cy="646331"/>
+            <a:ext cx="11594969" cy="923330"/>
           </a:xfrm>
           <a:prstGeom prst="rect">
             <a:avLst/>
@@ -30677,14 +30847,30 @@
           <a:noFill/>
         </p:spPr>
         <p:txBody>
-          <a:bodyPr wrap="square" rtlCol="0">
+          <a:bodyPr wrap="square" lIns="91440" tIns="45720" rIns="91440" bIns="45720" rtlCol="0" anchor="t">
             <a:spAutoFit/>
           </a:bodyPr>
           <a:lstStyle/>
           <a:p>
             <a:r>
+              <a:rPr lang="en-GB" dirty="0">
+                <a:solidFill>
+                  <a:srgbClr val="000000"/>
+                </a:solidFill>
+              </a:rPr>
+              <a:t>Introduction</a:t>
+            </a:r>
+            <a:r>
               <a:rPr lang="en-GB" dirty="0"/>
-              <a:t>Introduction                </a:t>
+              <a:t> </a:t>
+            </a:r>
+            <a:r>
+              <a:rPr lang="en-GB" dirty="0">
+                <a:solidFill>
+                  <a:srgbClr val="000000"/>
+                </a:solidFill>
+              </a:rPr>
+              <a:t>               </a:t>
             </a:r>
             <a:r>
               <a:rPr lang="en-GB" b="1" dirty="0">
@@ -30692,18 +30878,46 @@
                   <a:srgbClr val="FF0000"/>
                 </a:solidFill>
               </a:rPr>
-              <a:t>II. Data cleaning                   </a:t>
+              <a:t>II. Data cleaning  </a:t>
+            </a:r>
+            <a:r>
+              <a:rPr lang="en-GB" dirty="0">
+                <a:solidFill>
+                  <a:srgbClr val="000000"/>
+                </a:solidFill>
+              </a:rPr>
+              <a:t> </a:t>
             </a:r>
             <a:r>
               <a:rPr lang="en-GB" dirty="0"/>
-              <a:t>IV. First models application        VI. Features selection</a:t>
+              <a:t>                   </a:t>
             </a:r>
+            <a:r>
+              <a:rPr lang="en-GB" dirty="0">
+                <a:solidFill>
+                  <a:srgbClr val="000000"/>
+                </a:solidFill>
+              </a:rPr>
+              <a:t> </a:t>
+            </a:r>
+            <a:r>
+              <a:rPr lang="en-GB" dirty="0"/>
+              <a:t>IV. Grid search application      </a:t>
+            </a:r>
+            <a:endParaRPr lang="en-US">
+              <a:cs typeface="Calibri"/>
+            </a:endParaRPr>
           </a:p>
           <a:p>
             <a:r>
               <a:rPr lang="en-GB" dirty="0"/>
-              <a:t>I. Data description     III. Data preprocessing        V. Grid search application          Conclusion</a:t>
+              <a:t>I. Data description      III. First models application        V. Features selection            Conclusion</a:t>
             </a:r>
+          </a:p>
+          <a:p>
+            <a:endParaRPr lang="en-GB" dirty="0">
+              <a:cs typeface="Calibri"/>
+            </a:endParaRPr>
           </a:p>
         </p:txBody>
       </p:sp>
@@ -31422,7 +31636,7 @@
         <p:spPr>
           <a:xfrm>
             <a:off x="754144" y="169682"/>
-            <a:ext cx="11594969" cy="646331"/>
+            <a:ext cx="11594969" cy="923330"/>
           </a:xfrm>
           <a:prstGeom prst="rect">
             <a:avLst/>
@@ -31430,14 +31644,55 @@
           <a:noFill/>
         </p:spPr>
         <p:txBody>
-          <a:bodyPr wrap="square" rtlCol="0">
+          <a:bodyPr wrap="square" lIns="91440" tIns="45720" rIns="91440" bIns="45720" rtlCol="0" anchor="t">
             <a:spAutoFit/>
           </a:bodyPr>
           <a:lstStyle/>
           <a:p>
             <a:r>
+              <a:rPr lang="en-GB" dirty="0">
+                <a:solidFill>
+                  <a:srgbClr val="000000"/>
+                </a:solidFill>
+              </a:rPr>
+              <a:t>Introduction</a:t>
+            </a:r>
+            <a:r>
               <a:rPr lang="en-GB" dirty="0"/>
-              <a:t>Introduction                II. Data cleaning                   </a:t>
+              <a:t>                II. Data cleaning   </a:t>
+            </a:r>
+            <a:r>
+              <a:rPr lang="en-GB" dirty="0">
+                <a:solidFill>
+                  <a:srgbClr val="000000"/>
+                </a:solidFill>
+              </a:rPr>
+              <a:t>                   </a:t>
+            </a:r>
+            <a:r>
+              <a:rPr lang="en-GB" dirty="0"/>
+              <a:t> </a:t>
+            </a:r>
+            <a:r>
+              <a:rPr lang="en-GB" dirty="0">
+                <a:solidFill>
+                  <a:srgbClr val="000000"/>
+                </a:solidFill>
+              </a:rPr>
+              <a:t>IV. Grid search application</a:t>
+            </a:r>
+            <a:r>
+              <a:rPr lang="en-GB" dirty="0"/>
+              <a:t>      </a:t>
+            </a:r>
+            <a:endParaRPr lang="en-US">
+              <a:cs typeface="Calibri"/>
+            </a:endParaRPr>
+          </a:p>
+          <a:p>
+            <a:r>
+              <a:rPr lang="en-GB" dirty="0"/>
+              <a:t>I. Data description      </a:t>
             </a:r>
             <a:r>
               <a:rPr lang="en-GB" b="1" dirty="0">
@@ -31445,18 +31700,20 @@
                   <a:srgbClr val="FF0000"/>
                 </a:solidFill>
               </a:rPr>
-              <a:t>IV. First models application        </a:t>
+              <a:t>III. First models application </a:t>
             </a:r>
             <a:r>
               <a:rPr lang="en-GB" dirty="0"/>
-              <a:t>VI. Features selection</a:t>
+              <a:t>       V. Features selection            Conclusion</a:t>
             </a:r>
+            <a:endParaRPr lang="en-GB">
+              <a:cs typeface="Calibri"/>
+            </a:endParaRPr>
           </a:p>
           <a:p>
-            <a:r>
-              <a:rPr lang="en-GB" dirty="0"/>
-              <a:t>I. Data description     III. Data preprocessing        V. Grid search application          Conclusion</a:t>
-            </a:r>
+            <a:endParaRPr lang="en-GB" dirty="0">
+              <a:cs typeface="Calibri"/>
+            </a:endParaRPr>
           </a:p>
         </p:txBody>
       </p:sp>
@@ -31534,7 +31791,7 @@
         <p:spPr>
           <a:xfrm>
             <a:off x="754144" y="169682"/>
-            <a:ext cx="11594969" cy="646331"/>
+            <a:ext cx="11594969" cy="923330"/>
           </a:xfrm>
           <a:prstGeom prst="rect">
             <a:avLst/>
@@ -31542,20 +31799,22 @@
           <a:noFill/>
         </p:spPr>
         <p:txBody>
-          <a:bodyPr wrap="square" rtlCol="0">
+          <a:bodyPr wrap="square" lIns="91440" tIns="45720" rIns="91440" bIns="45720" rtlCol="0" anchor="t">
             <a:spAutoFit/>
           </a:bodyPr>
           <a:lstStyle/>
           <a:p>
             <a:r>
-              <a:rPr lang="en-GB" dirty="0"/>
-              <a:t>Introduction                II. Data cleaning                   IV. First models application        VI. Features selection</a:t>
+              <a:rPr lang="en-GB" dirty="0">
+                <a:solidFill>
+                  <a:srgbClr val="000000"/>
+                </a:solidFill>
+              </a:rPr>
+              <a:t>Introduction</a:t>
             </a:r>
-          </a:p>
-          <a:p>
             <a:r>
               <a:rPr lang="en-GB" dirty="0"/>
-              <a:t>I. Data description     III. Data preprocessing        </a:t>
+              <a:t>                II. Data cleaning                       </a:t>
             </a:r>
             <a:r>
               <a:rPr lang="en-GB" b="1" dirty="0">
@@ -31563,12 +31822,41 @@
                   <a:srgbClr val="FF0000"/>
                 </a:solidFill>
               </a:rPr>
-              <a:t>V. Grid search application          </a:t>
+              <a:t>IV. Grid search application </a:t>
+            </a:r>
+            <a:r>
+              <a:rPr lang="en-GB" dirty="0"/>
+              <a:t>     </a:t>
+            </a:r>
+            <a:endParaRPr lang="en-US">
+              <a:cs typeface="Calibri"/>
+            </a:endParaRPr>
+          </a:p>
+          <a:p>
+            <a:r>
+              <a:rPr lang="en-GB" dirty="0"/>
+              <a:t>I. Data description      III. First models application      </a:t>
+            </a:r>
+            <a:r>
+              <a:rPr lang="en-GB" dirty="0">
+                <a:solidFill>
+                  <a:srgbClr val="000000"/>
+                </a:solidFill>
+              </a:rPr>
+              <a:t>  V. Features selection            </a:t>
             </a:r>
             <a:r>
               <a:rPr lang="en-GB" dirty="0"/>
               <a:t>Conclusion</a:t>
             </a:r>
+            <a:endParaRPr lang="en-GB">
+              <a:cs typeface="Calibri"/>
+            </a:endParaRPr>
+          </a:p>
+          <a:p>
+            <a:endParaRPr lang="en-GB" dirty="0">
+              <a:cs typeface="Calibri"/>
+            </a:endParaRPr>
           </a:p>
         </p:txBody>
       </p:sp>
@@ -31699,7 +31987,7 @@
         <p:spPr>
           <a:xfrm>
             <a:off x="754144" y="169682"/>
-            <a:ext cx="11594969" cy="646331"/>
+            <a:ext cx="11594969" cy="923330"/>
           </a:xfrm>
           <a:prstGeom prst="rect">
             <a:avLst/>
@@ -31707,20 +31995,22 @@
           <a:noFill/>
         </p:spPr>
         <p:txBody>
-          <a:bodyPr wrap="square" rtlCol="0">
+          <a:bodyPr wrap="square" lIns="91440" tIns="45720" rIns="91440" bIns="45720" rtlCol="0" anchor="t">
             <a:spAutoFit/>
           </a:bodyPr>
           <a:lstStyle/>
           <a:p>
             <a:r>
-              <a:rPr lang="en-GB" dirty="0"/>
-              <a:t>Introduction                II. Data cleaning                   IV. First models application        VI. Features selection</a:t>
+              <a:rPr lang="en-GB" dirty="0">
+                <a:solidFill>
+                  <a:srgbClr val="000000"/>
+                </a:solidFill>
+              </a:rPr>
+              <a:t>Introduction</a:t>
             </a:r>
-          </a:p>
-          <a:p>
             <a:r>
               <a:rPr lang="en-GB" dirty="0"/>
-              <a:t>I. Data description     III. Data preprocessing        </a:t>
+              <a:t>                II. Data cleaning                      </a:t>
             </a:r>
             <a:r>
               <a:rPr lang="en-GB" b="1" dirty="0">
@@ -31728,12 +32018,38 @@
                   <a:srgbClr val="FF0000"/>
                 </a:solidFill>
               </a:rPr>
-              <a:t>V. Grid search application          </a:t>
+              <a:t> IV. Grid search application</a:t>
+            </a:r>
+            <a:r>
+              <a:rPr lang="en-GB" dirty="0"/>
+              <a:t>      </a:t>
+            </a:r>
+            <a:endParaRPr lang="en-US">
+              <a:cs typeface="Calibri"/>
+            </a:endParaRPr>
+          </a:p>
+          <a:p>
+            <a:r>
+              <a:rPr lang="en-GB" dirty="0"/>
+              <a:t>I. Data description      III. First models application      </a:t>
+            </a:r>
+            <a:r>
+              <a:rPr lang="en-GB" dirty="0">
+                <a:solidFill>
+                  <a:srgbClr val="000000"/>
+                </a:solidFill>
+              </a:rPr>
+              <a:t>  V. Features selection            </a:t>
             </a:r>
             <a:r>
               <a:rPr lang="en-GB" dirty="0"/>
               <a:t>Conclusion</a:t>
             </a:r>
+          </a:p>
+          <a:p>
+            <a:endParaRPr lang="en-GB" dirty="0">
+              <a:cs typeface="Calibri"/>
+            </a:endParaRPr>
           </a:p>
         </p:txBody>
       </p:sp>

</xml_diff>